<commit_message>
Project 2 - presentation - added link to gh
</commit_message>
<xml_diff>
--- a/Project_II/Documentation/MDGP_Project_02_MApostolov.pptx
+++ b/Project_II/Documentation/MDGP_Project_02_MApostolov.pptx
@@ -7373,6 +7373,23 @@
               <a:rPr lang="en-US" sz="1800" noProof="1"/>
               <a:t>GitHub:</a:t>
             </a:r>
+          </a:p>
+          <a:p>
+            <a:pPr marL="0" indent="0" rtl="0">
+              <a:buNone/>
+            </a:pPr>
+            <a:r>
+              <a:rPr lang="en-US" sz="1800" noProof="1">
+                <a:hlinkClick r:id="rId6"/>
+              </a:rPr>
+              <a:t>https://github.com/MApostolov-TU-Sofia/MDGP-projects/tree/main/Project_II</a:t>
+            </a:r>
+            <a:endParaRPr lang="en-US" sz="1800" noProof="1"/>
+          </a:p>
+          <a:p>
+            <a:pPr marL="0" indent="0" rtl="0">
+              <a:buNone/>
+            </a:pPr>
             <a:endParaRPr lang="ru-RU" sz="1800" noProof="1"/>
           </a:p>
           <a:p>
@@ -10153,6 +10170,15 @@
 </file>
 
 <file path=customXml/item1.xml><?xml version="1.0" encoding="utf-8"?>
+<?mso-contentType ?>
+<FormTemplates xmlns="http://schemas.microsoft.com/sharepoint/v3/contenttype/forms">
+  <Display>DocumentLibraryForm</Display>
+  <Edit>DocumentLibraryForm</Edit>
+  <New>DocumentLibraryForm</New>
+</FormTemplates>
+</file>
+
+<file path=customXml/item2.xml><?xml version="1.0" encoding="utf-8"?>
 <ct:contentTypeSchema xmlns:ct="http://schemas.microsoft.com/office/2006/metadata/contentType" xmlns:ma="http://schemas.microsoft.com/office/2006/metadata/properties/metaAttributes" ct:_="" ma:_="" ma:contentTypeName="Document" ma:contentTypeID="0x01010079F111ED35F8CC479449609E8A0923A6" ma:contentTypeVersion="11" ma:contentTypeDescription="Create a new document." ma:contentTypeScope="" ma:versionID="9677210f24a1be23c92c90fd886aa0aa">
   <xsd:schema xmlns:xsd="http://www.w3.org/2001/XMLSchema" xmlns:xs="http://www.w3.org/2001/XMLSchema" xmlns:p="http://schemas.microsoft.com/office/2006/metadata/properties" xmlns:ns2="71af3243-3dd4-4a8d-8c0d-dd76da1f02a5" xmlns:ns3="16c05727-aa75-4e4a-9b5f-8a80a1165891" targetNamespace="http://schemas.microsoft.com/office/2006/metadata/properties" ma:root="true" ma:fieldsID="60e05723c5c1908df1a1a4ebf11d344e" ns2:_="" ns3:_="">
     <xsd:import namespace="71af3243-3dd4-4a8d-8c0d-dd76da1f02a5"/>
@@ -10363,15 +10389,6 @@
 </ct:contentTypeSchema>
 </file>
 
-<file path=customXml/item2.xml><?xml version="1.0" encoding="utf-8"?>
-<?mso-contentType ?>
-<FormTemplates xmlns="http://schemas.microsoft.com/sharepoint/v3/contenttype/forms">
-  <Display>DocumentLibraryForm</Display>
-  <Edit>DocumentLibraryForm</Edit>
-  <New>DocumentLibraryForm</New>
-</FormTemplates>
-</file>
-
 <file path=customXml/item3.xml><?xml version="1.0" encoding="utf-8"?>
 <p:properties xmlns:p="http://schemas.microsoft.com/office/2006/metadata/properties" xmlns:xsi="http://www.w3.org/2001/XMLSchema-instance" xmlns:pc="http://schemas.microsoft.com/office/infopath/2007/PartnerControls">
   <documentManagement>
@@ -10381,6 +10398,14 @@
 </file>
 
 <file path=customXml/itemProps1.xml><?xml version="1.0" encoding="utf-8"?>
+<ds:datastoreItem xmlns:ds="http://schemas.openxmlformats.org/officeDocument/2006/customXml" ds:itemID="{10BEB954-4024-4CCF-A9D6-4C00FDC028D9}">
+  <ds:schemaRefs>
+    <ds:schemaRef ds:uri="http://schemas.microsoft.com/sharepoint/v3/contenttype/forms"/>
+  </ds:schemaRefs>
+</ds:datastoreItem>
+</file>
+
+<file path=customXml/itemProps2.xml><?xml version="1.0" encoding="utf-8"?>
 <ds:datastoreItem xmlns:ds="http://schemas.openxmlformats.org/officeDocument/2006/customXml" ds:itemID="{AB96CC85-5758-41C0-8EFD-737AFB69121D}">
   <ds:schemaRefs>
     <ds:schemaRef ds:uri="http://schemas.microsoft.com/office/2006/metadata/contentType"/>
@@ -10399,14 +10424,6 @@
 </ds:datastoreItem>
 </file>
 
-<file path=customXml/itemProps2.xml><?xml version="1.0" encoding="utf-8"?>
-<ds:datastoreItem xmlns:ds="http://schemas.openxmlformats.org/officeDocument/2006/customXml" ds:itemID="{10BEB954-4024-4CCF-A9D6-4C00FDC028D9}">
-  <ds:schemaRefs>
-    <ds:schemaRef ds:uri="http://schemas.microsoft.com/sharepoint/v3/contenttype/forms"/>
-  </ds:schemaRefs>
-</ds:datastoreItem>
-</file>
-
 <file path=customXml/itemProps3.xml><?xml version="1.0" encoding="utf-8"?>
 <ds:datastoreItem xmlns:ds="http://schemas.openxmlformats.org/officeDocument/2006/customXml" ds:itemID="{4710EE66-8707-456F-8F2E-091D581CB030}">
   <ds:schemaRefs>

</xml_diff>